<commit_message>
Update to wording on last slide for clarity
</commit_message>
<xml_diff>
--- a/PresentationEconomicAnalysisCaseStudy.pptx
+++ b/PresentationEconomicAnalysisCaseStudy.pptx
@@ -9469,7 +9469,7 @@
         <a:p>
           <a:r>
             <a:rPr lang="en-US" sz="1400" dirty="0"/>
-            <a:t>- Strong collinearity could limit use of two data points in regression analysis</a:t>
+            <a:t>- Strong collinearity could limit use of the two data points in regression analysis</a:t>
           </a:r>
         </a:p>
       </dgm:t>
@@ -9541,7 +9541,7 @@
         <a:p>
           <a:r>
             <a:rPr lang="en-US" sz="1400" dirty="0"/>
-            <a:t>- An increase in industrial materials costs can lead to an increase in the machinery used for oil extraction and transportation, as well as the production of renewable energy technologies such as windmills and solar panels</a:t>
+            <a:t>- An increase in industrial materials costs can lead to an increase in the  price of machinery used for oil extraction and transportation, as well as the production of renewable energy technologies such as windmills and solar panels</a:t>
           </a:r>
         </a:p>
       </dgm:t>
@@ -13812,7 +13812,7 @@
           </a:pPr>
           <a:r>
             <a:rPr lang="en-US" sz="1400" kern="1200" dirty="0"/>
-            <a:t>- Strong collinearity could limit use of two data points in regression analysis</a:t>
+            <a:t>- Strong collinearity could limit use of the two data points in regression analysis</a:t>
           </a:r>
         </a:p>
         <a:p>
@@ -13848,7 +13848,7 @@
           </a:pPr>
           <a:r>
             <a:rPr lang="en-US" sz="1400" kern="1200" dirty="0"/>
-            <a:t>- An increase in industrial materials costs can lead to an increase in the machinery used for oil extraction and transportation, as well as the production of renewable energy technologies such as windmills and solar panels</a:t>
+            <a:t>- An increase in industrial materials costs can lead to an increase in the  price of machinery used for oil extraction and transportation, as well as the production of renewable energy technologies such as windmills and solar panels</a:t>
           </a:r>
         </a:p>
       </dsp:txBody>
@@ -30087,7 +30087,7 @@
             <p:ph idx="1"/>
             <p:extLst>
               <p:ext uri="{D42A27DB-BD31-4B8C-83A1-F6EECF244321}">
-                <p14:modId xmlns:p14="http://schemas.microsoft.com/office/powerpoint/2010/main" val="135936769"/>
+                <p14:modId xmlns:p14="http://schemas.microsoft.com/office/powerpoint/2010/main" val="4062872103"/>
               </p:ext>
             </p:extLst>
           </p:nvPr>

</xml_diff>